<commit_message>
Avancée Code + PowerPoint
</commit_message>
<xml_diff>
--- a/Projet électif.pptx
+++ b/Projet électif.pptx
@@ -5,10 +5,10 @@
     <p:sldMasterId id="2147483732" r:id="rId1"/>
   </p:sldMasterIdLst>
   <p:notesMasterIdLst>
-    <p:notesMasterId r:id="rId14"/>
+    <p:notesMasterId r:id="rId17"/>
   </p:notesMasterIdLst>
   <p:handoutMasterIdLst>
-    <p:handoutMasterId r:id="rId15"/>
+    <p:handoutMasterId r:id="rId18"/>
   </p:handoutMasterIdLst>
   <p:sldIdLst>
     <p:sldId id="256" r:id="rId2"/>
@@ -20,9 +20,12 @@
     <p:sldId id="259" r:id="rId8"/>
     <p:sldId id="265" r:id="rId9"/>
     <p:sldId id="260" r:id="rId10"/>
-    <p:sldId id="261" r:id="rId11"/>
-    <p:sldId id="266" r:id="rId12"/>
-    <p:sldId id="267" r:id="rId13"/>
+    <p:sldId id="270" r:id="rId11"/>
+    <p:sldId id="269" r:id="rId12"/>
+    <p:sldId id="261" r:id="rId13"/>
+    <p:sldId id="266" r:id="rId14"/>
+    <p:sldId id="268" r:id="rId15"/>
+    <p:sldId id="267" r:id="rId16"/>
   </p:sldIdLst>
   <p:sldSz cx="12192000" cy="6858000"/>
   <p:notesSz cx="6858000" cy="9144000"/>
@@ -223,7 +226,7 @@
           <a:p>
             <a:fld id="{C34B4EED-50BE-47B9-BAF5-F7BDD7BEE753}" type="datetimeFigureOut">
               <a:rPr lang="fr-FR" smtClean="0"/>
-              <a:t>11/01/2020</a:t>
+              <a:t>17/01/2020</a:t>
             </a:fld>
             <a:endParaRPr lang="fr-FR"/>
           </a:p>
@@ -400,7 +403,7 @@
           <a:p>
             <a:fld id="{A634583A-3DC2-4121-A24A-FF1C1B658648}" type="datetimeFigureOut">
               <a:rPr lang="fr-FR" smtClean="0"/>
-              <a:t>11/01/2020</a:t>
+              <a:t>17/01/2020</a:t>
             </a:fld>
             <a:endParaRPr lang="fr-FR"/>
           </a:p>
@@ -1169,7 +1172,7 @@
           <a:p>
             <a:fld id="{02AC24A9-CCB6-4F8D-B8DB-C2F3692CFA5A}" type="datetimeFigureOut">
               <a:rPr lang="en-US" smtClean="0"/>
-              <a:t>1/11/2020</a:t>
+              <a:t>1/17/2020</a:t>
             </a:fld>
             <a:endParaRPr lang="en-US"/>
           </a:p>
@@ -1465,7 +1468,7 @@
           <a:p>
             <a:fld id="{02AC24A9-CCB6-4F8D-B8DB-C2F3692CFA5A}" type="datetimeFigureOut">
               <a:rPr lang="en-US" smtClean="0"/>
-              <a:t>1/11/2020</a:t>
+              <a:t>1/17/2020</a:t>
             </a:fld>
             <a:endParaRPr lang="en-US"/>
           </a:p>
@@ -1713,7 +1716,7 @@
           <a:p>
             <a:fld id="{02AC24A9-CCB6-4F8D-B8DB-C2F3692CFA5A}" type="datetimeFigureOut">
               <a:rPr lang="en-US" smtClean="0"/>
-              <a:t>1/11/2020</a:t>
+              <a:t>1/17/2020</a:t>
             </a:fld>
             <a:endParaRPr lang="en-US"/>
           </a:p>
@@ -2253,7 +2256,7 @@
           <a:p>
             <a:fld id="{02AC24A9-CCB6-4F8D-B8DB-C2F3692CFA5A}" type="datetimeFigureOut">
               <a:rPr lang="en-US" smtClean="0"/>
-              <a:t>1/11/2020</a:t>
+              <a:t>1/17/2020</a:t>
             </a:fld>
             <a:endParaRPr lang="en-US"/>
           </a:p>
@@ -2501,7 +2504,7 @@
           <a:p>
             <a:fld id="{02AC24A9-CCB6-4F8D-B8DB-C2F3692CFA5A}" type="datetimeFigureOut">
               <a:rPr lang="en-US" smtClean="0"/>
-              <a:t>1/11/2020</a:t>
+              <a:t>1/17/2020</a:t>
             </a:fld>
             <a:endParaRPr lang="en-US"/>
           </a:p>
@@ -3033,7 +3036,7 @@
           <a:p>
             <a:fld id="{02AC24A9-CCB6-4F8D-B8DB-C2F3692CFA5A}" type="datetimeFigureOut">
               <a:rPr lang="en-US" smtClean="0"/>
-              <a:t>1/11/2020</a:t>
+              <a:t>1/17/2020</a:t>
             </a:fld>
             <a:endParaRPr lang="en-US"/>
           </a:p>
@@ -3330,7 +3333,7 @@
           <a:p>
             <a:fld id="{02AC24A9-CCB6-4F8D-B8DB-C2F3692CFA5A}" type="datetimeFigureOut">
               <a:rPr lang="en-US" smtClean="0"/>
-              <a:t>1/11/2020</a:t>
+              <a:t>1/17/2020</a:t>
             </a:fld>
             <a:endParaRPr lang="en-US"/>
           </a:p>
@@ -3504,7 +3507,7 @@
           <a:p>
             <a:fld id="{02AC24A9-CCB6-4F8D-B8DB-C2F3692CFA5A}" type="datetimeFigureOut">
               <a:rPr lang="en-US" smtClean="0"/>
-              <a:t>1/11/2020</a:t>
+              <a:t>1/17/2020</a:t>
             </a:fld>
             <a:endParaRPr lang="en-US"/>
           </a:p>
@@ -3684,7 +3687,7 @@
           <a:p>
             <a:fld id="{02AC24A9-CCB6-4F8D-B8DB-C2F3692CFA5A}" type="datetimeFigureOut">
               <a:rPr lang="en-US" smtClean="0"/>
-              <a:t>1/11/2020</a:t>
+              <a:t>1/17/2020</a:t>
             </a:fld>
             <a:endParaRPr lang="en-US"/>
           </a:p>
@@ -3854,7 +3857,7 @@
           <a:p>
             <a:fld id="{02AC24A9-CCB6-4F8D-B8DB-C2F3692CFA5A}" type="datetimeFigureOut">
               <a:rPr lang="en-US" smtClean="0"/>
-              <a:t>1/11/2020</a:t>
+              <a:t>1/17/2020</a:t>
             </a:fld>
             <a:endParaRPr lang="en-US"/>
           </a:p>
@@ -4105,7 +4108,7 @@
           <a:p>
             <a:fld id="{02AC24A9-CCB6-4F8D-B8DB-C2F3692CFA5A}" type="datetimeFigureOut">
               <a:rPr lang="en-US" smtClean="0"/>
-              <a:t>1/11/2020</a:t>
+              <a:t>1/17/2020</a:t>
             </a:fld>
             <a:endParaRPr lang="en-US"/>
           </a:p>
@@ -4402,7 +4405,7 @@
           <a:p>
             <a:fld id="{02AC24A9-CCB6-4F8D-B8DB-C2F3692CFA5A}" type="datetimeFigureOut">
               <a:rPr lang="en-US" smtClean="0"/>
-              <a:t>1/11/2020</a:t>
+              <a:t>1/17/2020</a:t>
             </a:fld>
             <a:endParaRPr lang="en-US"/>
           </a:p>
@@ -4844,7 +4847,7 @@
           <a:p>
             <a:fld id="{02AC24A9-CCB6-4F8D-B8DB-C2F3692CFA5A}" type="datetimeFigureOut">
               <a:rPr lang="en-US" smtClean="0"/>
-              <a:t>1/11/2020</a:t>
+              <a:t>1/17/2020</a:t>
             </a:fld>
             <a:endParaRPr lang="en-US"/>
           </a:p>
@@ -4962,7 +4965,7 @@
           <a:p>
             <a:fld id="{02AC24A9-CCB6-4F8D-B8DB-C2F3692CFA5A}" type="datetimeFigureOut">
               <a:rPr lang="en-US" smtClean="0"/>
-              <a:t>1/11/2020</a:t>
+              <a:t>1/17/2020</a:t>
             </a:fld>
             <a:endParaRPr lang="en-US"/>
           </a:p>
@@ -5057,7 +5060,7 @@
           <a:p>
             <a:fld id="{02AC24A9-CCB6-4F8D-B8DB-C2F3692CFA5A}" type="datetimeFigureOut">
               <a:rPr lang="en-US" smtClean="0"/>
-              <a:t>1/11/2020</a:t>
+              <a:t>1/17/2020</a:t>
             </a:fld>
             <a:endParaRPr lang="en-US"/>
           </a:p>
@@ -5340,7 +5343,7 @@
           <a:p>
             <a:fld id="{02AC24A9-CCB6-4F8D-B8DB-C2F3692CFA5A}" type="datetimeFigureOut">
               <a:rPr lang="en-US" smtClean="0"/>
-              <a:t>1/11/2020</a:t>
+              <a:t>1/17/2020</a:t>
             </a:fld>
             <a:endParaRPr lang="en-US"/>
           </a:p>
@@ -5631,7 +5634,7 @@
           <a:p>
             <a:fld id="{02AC24A9-CCB6-4F8D-B8DB-C2F3692CFA5A}" type="datetimeFigureOut">
               <a:rPr lang="en-US" smtClean="0"/>
-              <a:t>1/11/2020</a:t>
+              <a:t>1/17/2020</a:t>
             </a:fld>
             <a:endParaRPr lang="en-US"/>
           </a:p>
@@ -6161,7 +6164,7 @@
           <a:p>
             <a:fld id="{02AC24A9-CCB6-4F8D-B8DB-C2F3692CFA5A}" type="datetimeFigureOut">
               <a:rPr lang="en-US" smtClean="0"/>
-              <a:t>1/11/2020</a:t>
+              <a:t>1/17/2020</a:t>
             </a:fld>
             <a:endParaRPr lang="en-US"/>
           </a:p>
@@ -6750,13 +6753,8 @@
           <a:p>
             <a:r>
               <a:rPr lang="fr-FR" dirty="0"/>
-              <a:t>Conception d’une </a:t>
-            </a:r>
-            <a:r>
-              <a:rPr lang="fr-FR" dirty="0" err="1"/>
-              <a:t>GameBoy</a:t>
-            </a:r>
-            <a:endParaRPr lang="fr-FR" dirty="0"/>
+              <a:t>Conception de deux Gameboy</a:t>
+            </a:r>
           </a:p>
         </p:txBody>
       </p:sp>
@@ -6830,6 +6828,41 @@
           </a:prstGeom>
         </p:spPr>
       </p:pic>
+      <p:sp>
+        <p:nvSpPr>
+          <p:cNvPr id="4" name="ZoneTexte 3">
+            <a:extLst>
+              <a:ext uri="{FF2B5EF4-FFF2-40B4-BE49-F238E27FC236}">
+                <a16:creationId xmlns:a16="http://schemas.microsoft.com/office/drawing/2014/main" id="{49EE1E5A-CA67-4372-B786-F6E0278C21FF}"/>
+              </a:ext>
+            </a:extLst>
+          </p:cNvPr>
+          <p:cNvSpPr txBox="1"/>
+          <p:nvPr/>
+        </p:nvSpPr>
+        <p:spPr>
+          <a:xfrm>
+            <a:off x="5011886" y="5809455"/>
+            <a:ext cx="6491136" cy="461665"/>
+          </a:xfrm>
+          <a:prstGeom prst="rect">
+            <a:avLst/>
+          </a:prstGeom>
+          <a:noFill/>
+        </p:spPr>
+        <p:txBody>
+          <a:bodyPr wrap="none" rtlCol="0">
+            <a:spAutoFit/>
+          </a:bodyPr>
+          <a:lstStyle/>
+          <a:p>
+            <a:r>
+              <a:rPr lang="fr-FR" sz="2400" dirty="0"/>
+              <a:t>SOUDIER Jean (GE4) – TESSIER Alexandre (MIQ4)</a:t>
+            </a:r>
+          </a:p>
+        </p:txBody>
+      </p:sp>
     </p:spTree>
     <p:extLst>
       <p:ext uri="{BB962C8B-B14F-4D97-AF65-F5344CB8AC3E}">
@@ -6865,6 +6898,348 @@
           <p:cNvPr id="2" name="ZoneTexte 1">
             <a:extLst>
               <a:ext uri="{FF2B5EF4-FFF2-40B4-BE49-F238E27FC236}">
+                <a16:creationId xmlns:a16="http://schemas.microsoft.com/office/drawing/2014/main" id="{C579E51F-ED8D-40F8-80A6-0ECFD9F42C70}"/>
+              </a:ext>
+            </a:extLst>
+          </p:cNvPr>
+          <p:cNvSpPr txBox="1"/>
+          <p:nvPr/>
+        </p:nvSpPr>
+        <p:spPr>
+          <a:xfrm>
+            <a:off x="3523376" y="796954"/>
+            <a:ext cx="6149130" cy="1477328"/>
+          </a:xfrm>
+          <a:prstGeom prst="rect">
+            <a:avLst/>
+          </a:prstGeom>
+          <a:noFill/>
+        </p:spPr>
+        <p:txBody>
+          <a:bodyPr wrap="square" rtlCol="0">
+            <a:spAutoFit/>
+          </a:bodyPr>
+          <a:lstStyle/>
+          <a:p>
+            <a:r>
+              <a:rPr lang="fr-FR" dirty="0"/>
+              <a:t>Répartition du travail pour la programmation:</a:t>
+            </a:r>
+          </a:p>
+          <a:p>
+            <a:r>
+              <a:rPr lang="fr-FR" dirty="0"/>
+              <a:t>Jean: programmation de toutes les fonctions de base (UART, SPI, Ecran, Boutons, Buzzer), préparation des menus</a:t>
+            </a:r>
+          </a:p>
+          <a:p>
+            <a:r>
+              <a:rPr lang="fr-FR" dirty="0"/>
+              <a:t>Alexandre: programmation du jeu: préparation des images, du code mémoire, programmation des modes de jeu</a:t>
+            </a:r>
+          </a:p>
+        </p:txBody>
+      </p:sp>
+      <p:sp>
+        <p:nvSpPr>
+          <p:cNvPr id="5" name="Espace réservé du numéro de diapositive 5">
+            <a:extLst>
+              <a:ext uri="{FF2B5EF4-FFF2-40B4-BE49-F238E27FC236}">
+                <a16:creationId xmlns:a16="http://schemas.microsoft.com/office/drawing/2014/main" id="{80F87924-2C03-469C-8788-12ECB7408734}"/>
+              </a:ext>
+            </a:extLst>
+          </p:cNvPr>
+          <p:cNvSpPr>
+            <a:spLocks noGrp="1"/>
+          </p:cNvSpPr>
+          <p:nvPr>
+            <p:ph type="sldNum" sz="quarter" idx="12"/>
+          </p:nvPr>
+        </p:nvSpPr>
+        <p:spPr>
+          <a:xfrm>
+            <a:off x="10951855" y="321374"/>
+            <a:ext cx="551167" cy="365125"/>
+          </a:xfrm>
+        </p:spPr>
+        <p:txBody>
+          <a:bodyPr/>
+          <a:lstStyle/>
+          <a:p>
+            <a:fld id="{B2DC25EE-239B-4C5F-AAD1-255A7D5F1EE2}" type="slidenum">
+              <a:rPr lang="en-US" smtClean="0"/>
+              <a:t>10</a:t>
+            </a:fld>
+            <a:endParaRPr lang="en-US" dirty="0"/>
+          </a:p>
+        </p:txBody>
+      </p:sp>
+      <p:pic>
+        <p:nvPicPr>
+          <p:cNvPr id="6" name="Image 5">
+            <a:extLst>
+              <a:ext uri="{FF2B5EF4-FFF2-40B4-BE49-F238E27FC236}">
+                <a16:creationId xmlns:a16="http://schemas.microsoft.com/office/drawing/2014/main" id="{547E47D8-E20F-4FE6-B5D4-9A130965B3BB}"/>
+              </a:ext>
+            </a:extLst>
+          </p:cNvPr>
+          <p:cNvPicPr>
+            <a:picLocks noChangeAspect="1"/>
+          </p:cNvPicPr>
+          <p:nvPr/>
+        </p:nvPicPr>
+        <p:blipFill>
+          <a:blip r:embed="rId2">
+            <a:extLst>
+              <a:ext uri="{28A0092B-C50C-407E-A947-70E740481C1C}">
+                <a14:useLocalDpi xmlns:a14="http://schemas.microsoft.com/office/drawing/2010/main" val="0"/>
+              </a:ext>
+            </a:extLst>
+          </a:blip>
+          <a:stretch>
+            <a:fillRect/>
+          </a:stretch>
+        </p:blipFill>
+        <p:spPr>
+          <a:xfrm>
+            <a:off x="0" y="6271120"/>
+            <a:ext cx="1600974" cy="586880"/>
+          </a:xfrm>
+          <a:prstGeom prst="rect">
+            <a:avLst/>
+          </a:prstGeom>
+        </p:spPr>
+      </p:pic>
+    </p:spTree>
+    <p:extLst>
+      <p:ext uri="{BB962C8B-B14F-4D97-AF65-F5344CB8AC3E}">
+        <p14:creationId xmlns:p14="http://schemas.microsoft.com/office/powerpoint/2010/main" val="1929410272"/>
+      </p:ext>
+    </p:extLst>
+  </p:cSld>
+  <p:clrMapOvr>
+    <a:masterClrMapping/>
+  </p:clrMapOvr>
+</p:sld>
+</file>
+
+<file path=ppt/slides/slide11.xml><?xml version="1.0" encoding="utf-8"?>
+<p:sld xmlns:a="http://schemas.openxmlformats.org/drawingml/2006/main" xmlns:r="http://schemas.openxmlformats.org/officeDocument/2006/relationships" xmlns:p="http://schemas.openxmlformats.org/presentationml/2006/main">
+  <p:cSld>
+    <p:spTree>
+      <p:nvGrpSpPr>
+        <p:cNvPr id="1" name=""/>
+        <p:cNvGrpSpPr/>
+        <p:nvPr/>
+      </p:nvGrpSpPr>
+      <p:grpSpPr>
+        <a:xfrm>
+          <a:off x="0" y="0"/>
+          <a:ext cx="0" cy="0"/>
+          <a:chOff x="0" y="0"/>
+          <a:chExt cx="0" cy="0"/>
+        </a:xfrm>
+      </p:grpSpPr>
+      <p:sp>
+        <p:nvSpPr>
+          <p:cNvPr id="2" name="ZoneTexte 1">
+            <a:extLst>
+              <a:ext uri="{FF2B5EF4-FFF2-40B4-BE49-F238E27FC236}">
+                <a16:creationId xmlns:a16="http://schemas.microsoft.com/office/drawing/2014/main" id="{C579E51F-ED8D-40F8-80A6-0ECFD9F42C70}"/>
+              </a:ext>
+            </a:extLst>
+          </p:cNvPr>
+          <p:cNvSpPr txBox="1"/>
+          <p:nvPr/>
+        </p:nvSpPr>
+        <p:spPr>
+          <a:xfrm>
+            <a:off x="3523376" y="796954"/>
+            <a:ext cx="6149130" cy="3416320"/>
+          </a:xfrm>
+          <a:prstGeom prst="rect">
+            <a:avLst/>
+          </a:prstGeom>
+          <a:noFill/>
+        </p:spPr>
+        <p:txBody>
+          <a:bodyPr wrap="square" rtlCol="0">
+            <a:spAutoFit/>
+          </a:bodyPr>
+          <a:lstStyle/>
+          <a:p>
+            <a:r>
+              <a:rPr lang="fr-FR" dirty="0"/>
+              <a:t>Plan mémoire :</a:t>
+            </a:r>
+          </a:p>
+          <a:p>
+            <a:endParaRPr lang="fr-FR" dirty="0"/>
+          </a:p>
+          <a:p>
+            <a:r>
+              <a:rPr lang="fr-FR" dirty="0"/>
+              <a:t>-&gt; Atmega 16a</a:t>
+            </a:r>
+          </a:p>
+          <a:p>
+            <a:r>
+              <a:rPr lang="fr-FR" dirty="0"/>
+              <a:t>0x0000 – 0x005F réservé</a:t>
+            </a:r>
+          </a:p>
+          <a:p>
+            <a:r>
+              <a:rPr lang="fr-FR" dirty="0"/>
+              <a:t>0x0060 – 0x045F [SRAM] variables programme + tables</a:t>
+            </a:r>
+          </a:p>
+          <a:p>
+            <a:r>
+              <a:rPr lang="fr-FR" dirty="0"/>
+              <a:t>0x0460 – 0x4460 [flash] mémoire programme</a:t>
+            </a:r>
+          </a:p>
+          <a:p>
+            <a:r>
+              <a:rPr lang="fr-FR" dirty="0"/>
+              <a:t>0x000-0x200 [EEPROM] stockage du son du jeu et des menus</a:t>
+            </a:r>
+          </a:p>
+          <a:p>
+            <a:endParaRPr lang="fr-FR" dirty="0"/>
+          </a:p>
+          <a:p>
+            <a:r>
+              <a:rPr lang="fr-FR" dirty="0"/>
+              <a:t>-&gt; Mémoire en SPI</a:t>
+            </a:r>
+          </a:p>
+          <a:p>
+            <a:r>
+              <a:rPr lang="fr-FR" dirty="0"/>
+              <a:t>0x0400 – 0x47FF images du jeu</a:t>
+            </a:r>
+          </a:p>
+          <a:p>
+            <a:r>
+              <a:rPr lang="fr-FR" dirty="0"/>
+              <a:t>0x4800 – 0x4DAF données du jeu</a:t>
+            </a:r>
+          </a:p>
+          <a:p>
+            <a:r>
+              <a:rPr lang="fr-FR" dirty="0"/>
+              <a:t>0x6800 – 0x7FFF images des menus de la console</a:t>
+            </a:r>
+          </a:p>
+        </p:txBody>
+      </p:sp>
+      <p:sp>
+        <p:nvSpPr>
+          <p:cNvPr id="5" name="Espace réservé du numéro de diapositive 5">
+            <a:extLst>
+              <a:ext uri="{FF2B5EF4-FFF2-40B4-BE49-F238E27FC236}">
+                <a16:creationId xmlns:a16="http://schemas.microsoft.com/office/drawing/2014/main" id="{80F87924-2C03-469C-8788-12ECB7408734}"/>
+              </a:ext>
+            </a:extLst>
+          </p:cNvPr>
+          <p:cNvSpPr>
+            <a:spLocks noGrp="1"/>
+          </p:cNvSpPr>
+          <p:nvPr>
+            <p:ph type="sldNum" sz="quarter" idx="12"/>
+          </p:nvPr>
+        </p:nvSpPr>
+        <p:spPr>
+          <a:xfrm>
+            <a:off x="10951855" y="321374"/>
+            <a:ext cx="551167" cy="365125"/>
+          </a:xfrm>
+        </p:spPr>
+        <p:txBody>
+          <a:bodyPr/>
+          <a:lstStyle/>
+          <a:p>
+            <a:fld id="{B2DC25EE-239B-4C5F-AAD1-255A7D5F1EE2}" type="slidenum">
+              <a:rPr lang="en-US" smtClean="0"/>
+              <a:t>11</a:t>
+            </a:fld>
+            <a:endParaRPr lang="en-US" dirty="0"/>
+          </a:p>
+        </p:txBody>
+      </p:sp>
+      <p:pic>
+        <p:nvPicPr>
+          <p:cNvPr id="6" name="Image 5">
+            <a:extLst>
+              <a:ext uri="{FF2B5EF4-FFF2-40B4-BE49-F238E27FC236}">
+                <a16:creationId xmlns:a16="http://schemas.microsoft.com/office/drawing/2014/main" id="{547E47D8-E20F-4FE6-B5D4-9A130965B3BB}"/>
+              </a:ext>
+            </a:extLst>
+          </p:cNvPr>
+          <p:cNvPicPr>
+            <a:picLocks noChangeAspect="1"/>
+          </p:cNvPicPr>
+          <p:nvPr/>
+        </p:nvPicPr>
+        <p:blipFill>
+          <a:blip r:embed="rId2">
+            <a:extLst>
+              <a:ext uri="{28A0092B-C50C-407E-A947-70E740481C1C}">
+                <a14:useLocalDpi xmlns:a14="http://schemas.microsoft.com/office/drawing/2010/main" val="0"/>
+              </a:ext>
+            </a:extLst>
+          </a:blip>
+          <a:stretch>
+            <a:fillRect/>
+          </a:stretch>
+        </p:blipFill>
+        <p:spPr>
+          <a:xfrm>
+            <a:off x="0" y="6271120"/>
+            <a:ext cx="1600974" cy="586880"/>
+          </a:xfrm>
+          <a:prstGeom prst="rect">
+            <a:avLst/>
+          </a:prstGeom>
+        </p:spPr>
+      </p:pic>
+    </p:spTree>
+    <p:extLst>
+      <p:ext uri="{BB962C8B-B14F-4D97-AF65-F5344CB8AC3E}">
+        <p14:creationId xmlns:p14="http://schemas.microsoft.com/office/powerpoint/2010/main" val="3368041899"/>
+      </p:ext>
+    </p:extLst>
+  </p:cSld>
+  <p:clrMapOvr>
+    <a:masterClrMapping/>
+  </p:clrMapOvr>
+</p:sld>
+</file>
+
+<file path=ppt/slides/slide12.xml><?xml version="1.0" encoding="utf-8"?>
+<p:sld xmlns:a="http://schemas.openxmlformats.org/drawingml/2006/main" xmlns:r="http://schemas.openxmlformats.org/officeDocument/2006/relationships" xmlns:p="http://schemas.openxmlformats.org/presentationml/2006/main">
+  <p:cSld>
+    <p:spTree>
+      <p:nvGrpSpPr>
+        <p:cNvPr id="1" name=""/>
+        <p:cNvGrpSpPr/>
+        <p:nvPr/>
+      </p:nvGrpSpPr>
+      <p:grpSpPr>
+        <a:xfrm>
+          <a:off x="0" y="0"/>
+          <a:ext cx="0" cy="0"/>
+          <a:chOff x="0" y="0"/>
+          <a:chExt cx="0" cy="0"/>
+        </a:xfrm>
+      </p:grpSpPr>
+      <p:sp>
+        <p:nvSpPr>
+          <p:cNvPr id="2" name="ZoneTexte 1">
+            <a:extLst>
+              <a:ext uri="{FF2B5EF4-FFF2-40B4-BE49-F238E27FC236}">
                 <a16:creationId xmlns:a16="http://schemas.microsoft.com/office/drawing/2014/main" id="{4FF84989-4CC7-4CE5-BF1A-224B6EC86150}"/>
               </a:ext>
             </a:extLst>
@@ -6989,7 +7364,7 @@
           <a:p>
             <a:fld id="{B2DC25EE-239B-4C5F-AAD1-255A7D5F1EE2}" type="slidenum">
               <a:rPr lang="en-US" smtClean="0"/>
-              <a:t>10</a:t>
+              <a:t>12</a:t>
             </a:fld>
             <a:endParaRPr lang="en-US" dirty="0"/>
           </a:p>
@@ -7044,7 +7419,202 @@
 </p:sld>
 </file>
 
-<file path=ppt/slides/slide11.xml><?xml version="1.0" encoding="utf-8"?>
+<file path=ppt/slides/slide13.xml><?xml version="1.0" encoding="utf-8"?>
+<p:sld xmlns:a="http://schemas.openxmlformats.org/drawingml/2006/main" xmlns:r="http://schemas.openxmlformats.org/officeDocument/2006/relationships" xmlns:p="http://schemas.openxmlformats.org/presentationml/2006/main">
+  <p:cSld>
+    <p:spTree>
+      <p:nvGrpSpPr>
+        <p:cNvPr id="1" name=""/>
+        <p:cNvGrpSpPr/>
+        <p:nvPr/>
+      </p:nvGrpSpPr>
+      <p:grpSpPr>
+        <a:xfrm>
+          <a:off x="0" y="0"/>
+          <a:ext cx="0" cy="0"/>
+          <a:chOff x="0" y="0"/>
+          <a:chExt cx="0" cy="0"/>
+        </a:xfrm>
+      </p:grpSpPr>
+      <p:sp>
+        <p:nvSpPr>
+          <p:cNvPr id="6" name="Espace réservé du numéro de diapositive 5">
+            <a:extLst>
+              <a:ext uri="{FF2B5EF4-FFF2-40B4-BE49-F238E27FC236}">
+                <a16:creationId xmlns:a16="http://schemas.microsoft.com/office/drawing/2014/main" id="{E9926667-C4AE-43A3-88E6-759B6E8DCFB3}"/>
+              </a:ext>
+            </a:extLst>
+          </p:cNvPr>
+          <p:cNvSpPr>
+            <a:spLocks noGrp="1"/>
+          </p:cNvSpPr>
+          <p:nvPr>
+            <p:ph type="sldNum" sz="quarter" idx="12"/>
+          </p:nvPr>
+        </p:nvSpPr>
+        <p:spPr>
+          <a:xfrm>
+            <a:off x="10951855" y="321374"/>
+            <a:ext cx="551167" cy="365125"/>
+          </a:xfrm>
+        </p:spPr>
+        <p:txBody>
+          <a:bodyPr/>
+          <a:lstStyle/>
+          <a:p>
+            <a:fld id="{B2DC25EE-239B-4C5F-AAD1-255A7D5F1EE2}" type="slidenum">
+              <a:rPr lang="en-US" smtClean="0"/>
+              <a:t>13</a:t>
+            </a:fld>
+            <a:endParaRPr lang="en-US" dirty="0"/>
+          </a:p>
+        </p:txBody>
+      </p:sp>
+      <p:pic>
+        <p:nvPicPr>
+          <p:cNvPr id="7" name="Image 6">
+            <a:extLst>
+              <a:ext uri="{FF2B5EF4-FFF2-40B4-BE49-F238E27FC236}">
+                <a16:creationId xmlns:a16="http://schemas.microsoft.com/office/drawing/2014/main" id="{82AD42F0-E31A-4262-89CD-4AED913D8861}"/>
+              </a:ext>
+            </a:extLst>
+          </p:cNvPr>
+          <p:cNvPicPr>
+            <a:picLocks noChangeAspect="1"/>
+          </p:cNvPicPr>
+          <p:nvPr/>
+        </p:nvPicPr>
+        <p:blipFill>
+          <a:blip r:embed="rId2">
+            <a:extLst>
+              <a:ext uri="{28A0092B-C50C-407E-A947-70E740481C1C}">
+                <a14:useLocalDpi xmlns:a14="http://schemas.microsoft.com/office/drawing/2010/main" val="0"/>
+              </a:ext>
+            </a:extLst>
+          </a:blip>
+          <a:stretch>
+            <a:fillRect/>
+          </a:stretch>
+        </p:blipFill>
+        <p:spPr>
+          <a:xfrm>
+            <a:off x="0" y="6271120"/>
+            <a:ext cx="1600974" cy="586880"/>
+          </a:xfrm>
+          <a:prstGeom prst="rect">
+            <a:avLst/>
+          </a:prstGeom>
+        </p:spPr>
+      </p:pic>
+      <p:sp>
+        <p:nvSpPr>
+          <p:cNvPr id="5" name="ZoneTexte 4">
+            <a:extLst>
+              <a:ext uri="{FF2B5EF4-FFF2-40B4-BE49-F238E27FC236}">
+                <a16:creationId xmlns:a16="http://schemas.microsoft.com/office/drawing/2014/main" id="{B9FDF780-0A10-4F98-9BD6-DEE167D624C7}"/>
+              </a:ext>
+            </a:extLst>
+          </p:cNvPr>
+          <p:cNvSpPr txBox="1"/>
+          <p:nvPr/>
+        </p:nvSpPr>
+        <p:spPr>
+          <a:xfrm>
+            <a:off x="2038525" y="1149292"/>
+            <a:ext cx="9421490" cy="1477328"/>
+          </a:xfrm>
+          <a:prstGeom prst="rect">
+            <a:avLst/>
+          </a:prstGeom>
+          <a:noFill/>
+        </p:spPr>
+        <p:txBody>
+          <a:bodyPr wrap="none" rtlCol="0">
+            <a:spAutoFit/>
+          </a:bodyPr>
+          <a:lstStyle/>
+          <a:p>
+            <a:r>
+              <a:rPr lang="fr-FR" dirty="0"/>
+              <a:t>Parler de la stratégie d’affichage sur l’écran:</a:t>
+            </a:r>
+          </a:p>
+          <a:p>
+            <a:pPr marL="285750" indent="-285750">
+              <a:buFontTx/>
+              <a:buChar char="-"/>
+            </a:pPr>
+            <a:r>
+              <a:rPr lang="fr-FR" dirty="0" err="1"/>
+              <a:t>Map</a:t>
+            </a:r>
+            <a:r>
+              <a:rPr lang="fr-FR" dirty="0"/>
+              <a:t>: labyrinthe composé de cases</a:t>
+            </a:r>
+          </a:p>
+          <a:p>
+            <a:pPr marL="285750" indent="-285750">
+              <a:buFontTx/>
+              <a:buChar char="-"/>
+            </a:pPr>
+            <a:r>
+              <a:rPr lang="fr-FR" dirty="0"/>
+              <a:t>Il y a en tout 17 images en fonction de la vue (avec ou sans adversaire, avec un mur ou non, </a:t>
+            </a:r>
+            <a:r>
+              <a:rPr lang="fr-FR" dirty="0" err="1"/>
+              <a:t>etc</a:t>
+            </a:r>
+            <a:r>
+              <a:rPr lang="fr-FR" dirty="0"/>
+              <a:t>)</a:t>
+            </a:r>
+          </a:p>
+          <a:p>
+            <a:pPr marL="285750" indent="-285750">
+              <a:buFontTx/>
+              <a:buChar char="-"/>
+            </a:pPr>
+            <a:r>
+              <a:rPr lang="fr-FR" dirty="0"/>
+              <a:t>Pour chaque case, un code décrit son environnement (numéro des cases voisines et autre)</a:t>
+            </a:r>
+          </a:p>
+          <a:p>
+            <a:pPr marL="285750" indent="-285750">
+              <a:buFontTx/>
+              <a:buChar char="-"/>
+            </a:pPr>
+            <a:r>
+              <a:rPr lang="fr-FR" dirty="0"/>
+              <a:t>Le code de la </a:t>
+            </a:r>
+            <a:r>
+              <a:rPr lang="fr-FR" dirty="0" err="1"/>
+              <a:t>map</a:t>
+            </a:r>
+            <a:r>
+              <a:rPr lang="fr-FR" dirty="0"/>
+              <a:t> décrit quelle image afficher en fonction de l’orientation du personnage</a:t>
+            </a:r>
+          </a:p>
+        </p:txBody>
+      </p:sp>
+    </p:spTree>
+    <p:extLst>
+      <p:ext uri="{BB962C8B-B14F-4D97-AF65-F5344CB8AC3E}">
+        <p14:creationId xmlns:p14="http://schemas.microsoft.com/office/powerpoint/2010/main" val="551879483"/>
+      </p:ext>
+    </p:extLst>
+  </p:cSld>
+  <p:clrMapOvr>
+    <a:masterClrMapping/>
+  </p:clrMapOvr>
+</p:sld>
+</file>
+
+<file path=ppt/slides/slide14.xml><?xml version="1.0" encoding="utf-8"?>
 <p:sld xmlns:a="http://schemas.openxmlformats.org/drawingml/2006/main" xmlns:r="http://schemas.openxmlformats.org/officeDocument/2006/relationships" xmlns:p="http://schemas.openxmlformats.org/presentationml/2006/main">
   <p:cSld>
     <p:spTree>
@@ -7149,7 +7719,7 @@
           <a:p>
             <a:fld id="{B2DC25EE-239B-4C5F-AAD1-255A7D5F1EE2}" type="slidenum">
               <a:rPr lang="en-US" smtClean="0"/>
-              <a:t>11</a:t>
+              <a:t>14</a:t>
             </a:fld>
             <a:endParaRPr lang="en-US" dirty="0"/>
           </a:p>
@@ -7191,10 +7761,103 @@
           </a:prstGeom>
         </p:spPr>
       </p:pic>
+      <p:sp>
+        <p:nvSpPr>
+          <p:cNvPr id="4" name="ZoneTexte 3">
+            <a:extLst>
+              <a:ext uri="{FF2B5EF4-FFF2-40B4-BE49-F238E27FC236}">
+                <a16:creationId xmlns:a16="http://schemas.microsoft.com/office/drawing/2014/main" id="{AF45EE03-F014-4220-B7D0-19241CBE6D1B}"/>
+              </a:ext>
+            </a:extLst>
+          </p:cNvPr>
+          <p:cNvSpPr txBox="1"/>
+          <p:nvPr/>
+        </p:nvSpPr>
+        <p:spPr>
+          <a:xfrm>
+            <a:off x="1661020" y="872455"/>
+            <a:ext cx="4408579" cy="2031325"/>
+          </a:xfrm>
+          <a:prstGeom prst="rect">
+            <a:avLst/>
+          </a:prstGeom>
+          <a:noFill/>
+        </p:spPr>
+        <p:txBody>
+          <a:bodyPr wrap="none" rtlCol="0">
+            <a:spAutoFit/>
+          </a:bodyPr>
+          <a:lstStyle/>
+          <a:p>
+            <a:r>
+              <a:rPr lang="fr-FR" dirty="0"/>
+              <a:t>Parler de la conception d’une image:</a:t>
+            </a:r>
+            <a:br>
+              <a:rPr lang="fr-FR" dirty="0"/>
+            </a:br>
+            <a:r>
+              <a:rPr lang="fr-FR" dirty="0"/>
+              <a:t>Du pixel art jusqu’à la mémoire:</a:t>
+            </a:r>
+          </a:p>
+          <a:p>
+            <a:pPr marL="285750" indent="-285750">
+              <a:buFontTx/>
+              <a:buChar char="-"/>
+            </a:pPr>
+            <a:r>
+              <a:rPr lang="fr-FR" dirty="0"/>
+              <a:t>Pixel art sur </a:t>
+            </a:r>
+            <a:r>
+              <a:rPr lang="fr-FR" dirty="0" err="1"/>
+              <a:t>excel</a:t>
+            </a:r>
+            <a:endParaRPr lang="fr-FR" dirty="0"/>
+          </a:p>
+          <a:p>
+            <a:pPr marL="285750" indent="-285750">
+              <a:buFontTx/>
+              <a:buChar char="-"/>
+            </a:pPr>
+            <a:r>
+              <a:rPr lang="fr-FR" dirty="0"/>
+              <a:t>Récupération du code binaire</a:t>
+            </a:r>
+          </a:p>
+          <a:p>
+            <a:pPr marL="285750" indent="-285750">
+              <a:buFontTx/>
+              <a:buChar char="-"/>
+            </a:pPr>
+            <a:r>
+              <a:rPr lang="fr-FR" dirty="0"/>
+              <a:t>Transformation en hexadécimal </a:t>
+            </a:r>
+          </a:p>
+          <a:p>
+            <a:r>
+              <a:rPr lang="fr-FR" dirty="0"/>
+              <a:t>(algorithme spécial car écran coupé en deux)</a:t>
+            </a:r>
+          </a:p>
+          <a:p>
+            <a:pPr marL="285750" indent="-285750">
+              <a:buFontTx/>
+              <a:buChar char="-"/>
+            </a:pPr>
+            <a:r>
+              <a:rPr lang="fr-FR" dirty="0"/>
+              <a:t>Stockage sur la mémoire</a:t>
+            </a:r>
+          </a:p>
+        </p:txBody>
+      </p:sp>
     </p:spTree>
     <p:extLst>
       <p:ext uri="{BB962C8B-B14F-4D97-AF65-F5344CB8AC3E}">
-        <p14:creationId xmlns:p14="http://schemas.microsoft.com/office/powerpoint/2010/main" val="551879483"/>
+        <p14:creationId xmlns:p14="http://schemas.microsoft.com/office/powerpoint/2010/main" val="1387899118"/>
       </p:ext>
     </p:extLst>
   </p:cSld>
@@ -7204,7 +7867,7 @@
 </p:sld>
 </file>
 
-<file path=ppt/slides/slide12.xml><?xml version="1.0" encoding="utf-8"?>
+<file path=ppt/slides/slide15.xml><?xml version="1.0" encoding="utf-8"?>
 <p:sld xmlns:a="http://schemas.openxmlformats.org/drawingml/2006/main" xmlns:r="http://schemas.openxmlformats.org/officeDocument/2006/relationships" xmlns:p="http://schemas.openxmlformats.org/presentationml/2006/main">
   <p:cSld>
     <p:spTree>
@@ -7295,7 +7958,7 @@
           <a:p>
             <a:fld id="{B2DC25EE-239B-4C5F-AAD1-255A7D5F1EE2}" type="slidenum">
               <a:rPr lang="en-US" smtClean="0"/>
-              <a:t>12</a:t>
+              <a:t>15</a:t>
             </a:fld>
             <a:endParaRPr lang="en-US" dirty="0"/>
           </a:p>
@@ -8743,7 +9406,7 @@
         <p:spPr>
           <a:xfrm>
             <a:off x="3523376" y="796954"/>
-            <a:ext cx="6149130" cy="3416320"/>
+            <a:ext cx="6149130" cy="646331"/>
           </a:xfrm>
           <a:prstGeom prst="rect">
             <a:avLst/>
@@ -8758,67 +9421,15 @@
           <a:p>
             <a:r>
               <a:rPr lang="fr-FR" dirty="0"/>
-              <a:t>Plan mémoire :</a:t>
-            </a:r>
-          </a:p>
-          <a:p>
-            <a:endParaRPr lang="fr-FR" dirty="0"/>
-          </a:p>
-          <a:p>
+              <a:t>Présentation du jeu: </a:t>
+            </a:r>
+            <a:r>
+              <a:rPr lang="fr-FR" dirty="0" err="1"/>
+              <a:t>fps</a:t>
+            </a:r>
             <a:r>
               <a:rPr lang="fr-FR" dirty="0"/>
-              <a:t>-&gt; Atmega 16a</a:t>
-            </a:r>
-          </a:p>
-          <a:p>
-            <a:r>
-              <a:rPr lang="fr-FR" dirty="0"/>
-              <a:t>0x0000 – 0x005F réservé</a:t>
-            </a:r>
-          </a:p>
-          <a:p>
-            <a:r>
-              <a:rPr lang="fr-FR" dirty="0"/>
-              <a:t>0x0060 – 0x045F [SRAM] variables programme + tables</a:t>
-            </a:r>
-          </a:p>
-          <a:p>
-            <a:r>
-              <a:rPr lang="fr-FR" dirty="0"/>
-              <a:t>0x0460 – 0x4460 [flash] mémoire programme</a:t>
-            </a:r>
-          </a:p>
-          <a:p>
-            <a:r>
-              <a:rPr lang="fr-FR" dirty="0"/>
-              <a:t>0x000-0x200 [EEPROM] stockage du son du jeu et des menus</a:t>
-            </a:r>
-          </a:p>
-          <a:p>
-            <a:endParaRPr lang="fr-FR" dirty="0"/>
-          </a:p>
-          <a:p>
-            <a:r>
-              <a:rPr lang="fr-FR" dirty="0"/>
-              <a:t>-&gt; Mémoire en SPI</a:t>
-            </a:r>
-          </a:p>
-          <a:p>
-            <a:r>
-              <a:rPr lang="fr-FR" dirty="0"/>
-              <a:t>0x0400 – 0x47FF image du jeu</a:t>
-            </a:r>
-          </a:p>
-          <a:p>
-            <a:r>
-              <a:rPr lang="fr-FR" dirty="0"/>
-              <a:t>0x4800 – 0x4DAF données du jeu</a:t>
-            </a:r>
-          </a:p>
-          <a:p>
-            <a:r>
-              <a:rPr lang="fr-FR" dirty="0"/>
-              <a:t>0x6800 – 0x7FFF image des menus de la console</a:t>
+              <a:t>, deux modes de jeu (un en réseau et un solo)</a:t>
             </a:r>
           </a:p>
         </p:txBody>

</xml_diff>